<commit_message>
Finsihed presentation slide show
</commit_message>
<xml_diff>
--- a/ppt/Portfolio.pptx
+++ b/ppt/Portfolio.pptx
@@ -9,6 +9,17 @@
     <p:sldId id="261" r:id="rId6"/>
     <p:sldId id="262" r:id="rId7"/>
     <p:sldId id="263" r:id="rId8"/>
+    <p:sldId id="264" r:id="rId9"/>
+    <p:sldId id="265" r:id="rId10"/>
+    <p:sldId id="266" r:id="rId11"/>
+    <p:sldId id="267" r:id="rId12"/>
+    <p:sldId id="268" r:id="rId13"/>
+    <p:sldId id="269" r:id="rId14"/>
+    <p:sldId id="270" r:id="rId15"/>
+    <p:sldId id="271" r:id="rId16"/>
+    <p:sldId id="272" r:id="rId17"/>
+    <p:sldId id="273" r:id="rId18"/>
+    <p:sldId id="274" r:id="rId19"/>
   </p:sldIdLst>
   <p:sldSz cx="12192000" cy="6858000"/>
   <p:notesSz cx="6858000" cy="9144000"/>
@@ -3554,7 +3565,7 @@
           <a:p>
             <a:fld id="{EA0C0817-A112-4847-8014-A94B7D2A4EA3}" type="datetime1">
               <a:rPr lang="en-US" smtClean="0"/>
-              <a:t>11/13/2021</a:t>
+              <a:t>11/26/2021</a:t>
             </a:fld>
             <a:endParaRPr lang="en-US" dirty="0"/>
           </a:p>
@@ -3756,7 +3767,7 @@
           <a:p>
             <a:fld id="{7332B432-ACDA-4023-A761-2BAB76577B62}" type="datetime1">
               <a:rPr lang="en-US" smtClean="0"/>
-              <a:t>11/13/2021</a:t>
+              <a:t>11/26/2021</a:t>
             </a:fld>
             <a:endParaRPr lang="en-US" dirty="0"/>
           </a:p>
@@ -4355,7 +4366,7 @@
           <a:p>
             <a:fld id="{D9C646AA-F36E-4540-911D-FFFC0A0EF24A}" type="datetime1">
               <a:rPr lang="en-US" smtClean="0"/>
-              <a:t>11/13/2021</a:t>
+              <a:t>11/26/2021</a:t>
             </a:fld>
             <a:endParaRPr lang="en-US" dirty="0"/>
           </a:p>
@@ -4675,7 +4686,7 @@
           <a:p>
             <a:fld id="{69186D26-FA5F-4637-B602-B7C2DC34CFD4}" type="datetime1">
               <a:rPr lang="en-US" smtClean="0"/>
-              <a:t>11/13/2021</a:t>
+              <a:t>11/26/2021</a:t>
             </a:fld>
             <a:endParaRPr lang="en-US" dirty="0"/>
           </a:p>
@@ -5112,7 +5123,7 @@
           <a:p>
             <a:fld id="{8A7F15D8-96D1-4781-BC50-CA8A088B2FE4}" type="datetime1">
               <a:rPr lang="en-US" smtClean="0"/>
-              <a:t>11/13/2021</a:t>
+              <a:t>11/26/2021</a:t>
             </a:fld>
             <a:endParaRPr lang="en-US" dirty="0"/>
           </a:p>
@@ -5230,7 +5241,7 @@
           <a:p>
             <a:fld id="{F9A96C99-B8F8-4528-BD05-0E16E943DC09}" type="datetime1">
               <a:rPr lang="en-US" smtClean="0"/>
-              <a:t>11/13/2021</a:t>
+              <a:t>11/26/2021</a:t>
             </a:fld>
             <a:endParaRPr lang="en-US" dirty="0"/>
           </a:p>
@@ -5325,7 +5336,7 @@
           <a:p>
             <a:fld id="{03636942-C211-4B28-8DBD-C953E00AF71B}" type="datetime1">
               <a:rPr lang="en-US" smtClean="0"/>
-              <a:t>11/13/2021</a:t>
+              <a:t>11/26/2021</a:t>
             </a:fld>
             <a:endParaRPr lang="en-US" dirty="0"/>
           </a:p>
@@ -5742,7 +5753,7 @@
           <a:p>
             <a:fld id="{7E8D12A6-918A-48BD-8CB9-CA713993B0EA}" type="datetime1">
               <a:rPr lang="en-US" smtClean="0"/>
-              <a:t>11/13/2021</a:t>
+              <a:t>11/26/2021</a:t>
             </a:fld>
             <a:endParaRPr lang="en-US" dirty="0"/>
           </a:p>
@@ -6004,7 +6015,7 @@
             <a:fld id="{E778CE86-875F-4587-BCF6-FA054AFC0D53}" type="datetime1">
               <a:rPr lang="en-US" smtClean="0"/>
               <a:pPr/>
-              <a:t>11/13/2021</a:t>
+              <a:t>11/26/2021</a:t>
             </a:fld>
             <a:endParaRPr lang="en-US" dirty="0"/>
           </a:p>
@@ -6520,7 +6531,7 @@
           <a:p>
             <a:fld id="{F6FA2B21-3FCD-4721-B95C-427943F61125}" type="datetime1">
               <a:rPr lang="en-US" smtClean="0"/>
-              <a:t>11/13/2021</a:t>
+              <a:t>11/26/2021</a:t>
             </a:fld>
             <a:endParaRPr lang="en-US" dirty="0"/>
           </a:p>
@@ -7215,6 +7226,939 @@
 </p:sld>
 </file>
 
+<file path=ppt/slides/slide10.xml><?xml version="1.0" encoding="utf-8"?>
+<p:sld xmlns:a="http://schemas.openxmlformats.org/drawingml/2006/main" xmlns:r="http://schemas.openxmlformats.org/officeDocument/2006/relationships" xmlns:p="http://schemas.openxmlformats.org/presentationml/2006/main">
+  <p:cSld>
+    <p:spTree>
+      <p:nvGrpSpPr>
+        <p:cNvPr id="1" name=""/>
+        <p:cNvGrpSpPr/>
+        <p:nvPr/>
+      </p:nvGrpSpPr>
+      <p:grpSpPr>
+        <a:xfrm>
+          <a:off x="0" y="0"/>
+          <a:ext cx="0" cy="0"/>
+          <a:chOff x="0" y="0"/>
+          <a:chExt cx="0" cy="0"/>
+        </a:xfrm>
+      </p:grpSpPr>
+      <p:sp>
+        <p:nvSpPr>
+          <p:cNvPr id="2" name="Title 1">
+            <a:extLst>
+              <a:ext uri="{FF2B5EF4-FFF2-40B4-BE49-F238E27FC236}">
+                <a16:creationId xmlns:a16="http://schemas.microsoft.com/office/drawing/2014/main" id="{3F976B2E-7986-4BD6-9B7C-58B41381C812}"/>
+              </a:ext>
+            </a:extLst>
+          </p:cNvPr>
+          <p:cNvSpPr>
+            <a:spLocks noGrp="1"/>
+          </p:cNvSpPr>
+          <p:nvPr>
+            <p:ph type="title"/>
+          </p:nvPr>
+        </p:nvSpPr>
+        <p:spPr/>
+        <p:txBody>
+          <a:bodyPr>
+            <a:normAutofit fontScale="90000"/>
+          </a:bodyPr>
+          <a:lstStyle/>
+          <a:p>
+            <a:r>
+              <a:rPr lang="en-AU" dirty="0"/>
+              <a:t>“If I find you…</a:t>
+            </a:r>
+            <a:br>
+              <a:rPr lang="en-AU" dirty="0"/>
+            </a:br>
+            <a:r>
+              <a:rPr lang="en-AU" dirty="0"/>
+              <a:t>I will…potentially hire you :D”</a:t>
+            </a:r>
+          </a:p>
+        </p:txBody>
+      </p:sp>
+      <p:sp>
+        <p:nvSpPr>
+          <p:cNvPr id="3" name="Content Placeholder 2">
+            <a:extLst>
+              <a:ext uri="{FF2B5EF4-FFF2-40B4-BE49-F238E27FC236}">
+                <a16:creationId xmlns:a16="http://schemas.microsoft.com/office/drawing/2014/main" id="{2E5B7584-F4D7-4252-B28B-F1B9457A8EB6}"/>
+              </a:ext>
+            </a:extLst>
+          </p:cNvPr>
+          <p:cNvSpPr>
+            <a:spLocks noGrp="1"/>
+          </p:cNvSpPr>
+          <p:nvPr>
+            <p:ph idx="1"/>
+          </p:nvPr>
+        </p:nvSpPr>
+        <p:spPr/>
+        <p:txBody>
+          <a:bodyPr/>
+          <a:lstStyle/>
+          <a:p>
+            <a:endParaRPr lang="en-AU" dirty="0"/>
+          </a:p>
+        </p:txBody>
+      </p:sp>
+      <p:sp>
+        <p:nvSpPr>
+          <p:cNvPr id="4" name="Text Placeholder 3">
+            <a:extLst>
+              <a:ext uri="{FF2B5EF4-FFF2-40B4-BE49-F238E27FC236}">
+                <a16:creationId xmlns:a16="http://schemas.microsoft.com/office/drawing/2014/main" id="{73C2DEEE-6B8C-4A80-916E-B85AA85BAD2B}"/>
+              </a:ext>
+            </a:extLst>
+          </p:cNvPr>
+          <p:cNvSpPr>
+            <a:spLocks noGrp="1"/>
+          </p:cNvSpPr>
+          <p:nvPr>
+            <p:ph type="body" sz="half" idx="2"/>
+          </p:nvPr>
+        </p:nvSpPr>
+        <p:spPr/>
+        <p:txBody>
+          <a:bodyPr>
+            <a:normAutofit fontScale="85000" lnSpcReduction="10000"/>
+          </a:bodyPr>
+          <a:lstStyle/>
+          <a:p>
+            <a:pPr marL="285750" indent="-285750">
+              <a:buFont typeface="Arial" panose="020B0604020202020204" pitchFamily="34" charset="0"/>
+              <a:buChar char="•"/>
+            </a:pPr>
+            <a:r>
+              <a:rPr lang="en-AU" dirty="0"/>
+              <a:t>The contact page is much like the about page, containing a simple contact form which can be filled in with your email, name and a body.</a:t>
+            </a:r>
+          </a:p>
+          <a:p>
+            <a:pPr marL="285750" indent="-285750">
+              <a:buFont typeface="Arial" panose="020B0604020202020204" pitchFamily="34" charset="0"/>
+              <a:buChar char="•"/>
+            </a:pPr>
+            <a:r>
+              <a:rPr lang="en-AU" dirty="0"/>
+              <a:t>Not displayed there is a simple submit button which will submit the form.</a:t>
+            </a:r>
+          </a:p>
+          <a:p>
+            <a:pPr marL="285750" indent="-285750">
+              <a:buFont typeface="Arial" panose="020B0604020202020204" pitchFamily="34" charset="0"/>
+              <a:buChar char="•"/>
+            </a:pPr>
+            <a:r>
+              <a:rPr lang="en-AU" dirty="0"/>
+              <a:t>There isn’t really much I can say about this page, its as simple in concept as it is in design.</a:t>
+            </a:r>
+          </a:p>
+        </p:txBody>
+      </p:sp>
+      <p:pic>
+        <p:nvPicPr>
+          <p:cNvPr id="8" name="Picture 7">
+            <a:extLst>
+              <a:ext uri="{FF2B5EF4-FFF2-40B4-BE49-F238E27FC236}">
+                <a16:creationId xmlns:a16="http://schemas.microsoft.com/office/drawing/2014/main" id="{AE5AFF50-3EE0-40E9-BC99-51F9AEE91A13}"/>
+              </a:ext>
+            </a:extLst>
+          </p:cNvPr>
+          <p:cNvPicPr>
+            <a:picLocks noChangeAspect="1"/>
+          </p:cNvPicPr>
+          <p:nvPr/>
+        </p:nvPicPr>
+        <p:blipFill>
+          <a:blip r:embed="rId2"/>
+          <a:stretch>
+            <a:fillRect/>
+          </a:stretch>
+        </p:blipFill>
+        <p:spPr>
+          <a:xfrm>
+            <a:off x="685800" y="1863421"/>
+            <a:ext cx="6858000" cy="3131158"/>
+          </a:xfrm>
+          <a:prstGeom prst="rect">
+            <a:avLst/>
+          </a:prstGeom>
+        </p:spPr>
+      </p:pic>
+    </p:spTree>
+    <p:extLst>
+      <p:ext uri="{BB962C8B-B14F-4D97-AF65-F5344CB8AC3E}">
+        <p14:creationId xmlns:p14="http://schemas.microsoft.com/office/powerpoint/2010/main" val="2337771681"/>
+      </p:ext>
+    </p:extLst>
+  </p:cSld>
+  <p:clrMapOvr>
+    <a:masterClrMapping/>
+  </p:clrMapOvr>
+</p:sld>
+</file>
+
+<file path=ppt/slides/slide11.xml><?xml version="1.0" encoding="utf-8"?>
+<p:sld xmlns:a="http://schemas.openxmlformats.org/drawingml/2006/main" xmlns:r="http://schemas.openxmlformats.org/officeDocument/2006/relationships" xmlns:p="http://schemas.openxmlformats.org/presentationml/2006/main">
+  <p:cSld>
+    <p:spTree>
+      <p:nvGrpSpPr>
+        <p:cNvPr id="1" name=""/>
+        <p:cNvGrpSpPr/>
+        <p:nvPr/>
+      </p:nvGrpSpPr>
+      <p:grpSpPr>
+        <a:xfrm>
+          <a:off x="0" y="0"/>
+          <a:ext cx="0" cy="0"/>
+          <a:chOff x="0" y="0"/>
+          <a:chExt cx="0" cy="0"/>
+        </a:xfrm>
+      </p:grpSpPr>
+      <p:sp>
+        <p:nvSpPr>
+          <p:cNvPr id="2" name="Title 1">
+            <a:extLst>
+              <a:ext uri="{FF2B5EF4-FFF2-40B4-BE49-F238E27FC236}">
+                <a16:creationId xmlns:a16="http://schemas.microsoft.com/office/drawing/2014/main" id="{EFC1ADB8-841A-4449-BF67-C2631169355E}"/>
+              </a:ext>
+            </a:extLst>
+          </p:cNvPr>
+          <p:cNvSpPr>
+            <a:spLocks noGrp="1"/>
+          </p:cNvSpPr>
+          <p:nvPr>
+            <p:ph type="title"/>
+          </p:nvPr>
+        </p:nvSpPr>
+        <p:spPr/>
+        <p:txBody>
+          <a:bodyPr/>
+          <a:lstStyle/>
+          <a:p>
+            <a:r>
+              <a:rPr lang="en-AU" dirty="0"/>
+              <a:t>Build like </a:t>
+            </a:r>
+            <a:r>
+              <a:rPr lang="en-AU" dirty="0" err="1"/>
+              <a:t>lego</a:t>
+            </a:r>
+            <a:endParaRPr lang="en-AU" dirty="0"/>
+          </a:p>
+        </p:txBody>
+      </p:sp>
+      <p:sp>
+        <p:nvSpPr>
+          <p:cNvPr id="3" name="Text Placeholder 2">
+            <a:extLst>
+              <a:ext uri="{FF2B5EF4-FFF2-40B4-BE49-F238E27FC236}">
+                <a16:creationId xmlns:a16="http://schemas.microsoft.com/office/drawing/2014/main" id="{607CFB2C-8D63-4EEA-B408-C907757A88A9}"/>
+              </a:ext>
+            </a:extLst>
+          </p:cNvPr>
+          <p:cNvSpPr>
+            <a:spLocks noGrp="1"/>
+          </p:cNvSpPr>
+          <p:nvPr>
+            <p:ph type="body" idx="1"/>
+          </p:nvPr>
+        </p:nvSpPr>
+        <p:spPr/>
+        <p:txBody>
+          <a:bodyPr/>
+          <a:lstStyle/>
+          <a:p>
+            <a:r>
+              <a:rPr lang="en-AU" dirty="0"/>
+              <a:t>How the site is put together.</a:t>
+            </a:r>
+          </a:p>
+        </p:txBody>
+      </p:sp>
+    </p:spTree>
+    <p:extLst>
+      <p:ext uri="{BB962C8B-B14F-4D97-AF65-F5344CB8AC3E}">
+        <p14:creationId xmlns:p14="http://schemas.microsoft.com/office/powerpoint/2010/main" val="1221883233"/>
+      </p:ext>
+    </p:extLst>
+  </p:cSld>
+  <p:clrMapOvr>
+    <a:masterClrMapping/>
+  </p:clrMapOvr>
+</p:sld>
+</file>
+
+<file path=ppt/slides/slide12.xml><?xml version="1.0" encoding="utf-8"?>
+<p:sld xmlns:a="http://schemas.openxmlformats.org/drawingml/2006/main" xmlns:r="http://schemas.openxmlformats.org/officeDocument/2006/relationships" xmlns:p="http://schemas.openxmlformats.org/presentationml/2006/main">
+  <p:cSld>
+    <p:spTree>
+      <p:nvGrpSpPr>
+        <p:cNvPr id="1" name=""/>
+        <p:cNvGrpSpPr/>
+        <p:nvPr/>
+      </p:nvGrpSpPr>
+      <p:grpSpPr>
+        <a:xfrm>
+          <a:off x="0" y="0"/>
+          <a:ext cx="0" cy="0"/>
+          <a:chOff x="0" y="0"/>
+          <a:chExt cx="0" cy="0"/>
+        </a:xfrm>
+      </p:grpSpPr>
+      <p:sp>
+        <p:nvSpPr>
+          <p:cNvPr id="2" name="Title 1">
+            <a:extLst>
+              <a:ext uri="{FF2B5EF4-FFF2-40B4-BE49-F238E27FC236}">
+                <a16:creationId xmlns:a16="http://schemas.microsoft.com/office/drawing/2014/main" id="{618924E2-06CD-473F-A8FE-09FC0D6CA2DB}"/>
+              </a:ext>
+            </a:extLst>
+          </p:cNvPr>
+          <p:cNvSpPr>
+            <a:spLocks noGrp="1"/>
+          </p:cNvSpPr>
+          <p:nvPr>
+            <p:ph type="title"/>
+          </p:nvPr>
+        </p:nvSpPr>
+        <p:spPr/>
+        <p:txBody>
+          <a:bodyPr/>
+          <a:lstStyle/>
+          <a:p>
+            <a:r>
+              <a:rPr lang="en-AU" dirty="0"/>
+              <a:t>How the house is stacked.</a:t>
+            </a:r>
+          </a:p>
+        </p:txBody>
+      </p:sp>
+      <p:pic>
+        <p:nvPicPr>
+          <p:cNvPr id="10" name="Content Placeholder 9" descr="A picture containing text&#10;&#10;Description automatically generated">
+            <a:extLst>
+              <a:ext uri="{FF2B5EF4-FFF2-40B4-BE49-F238E27FC236}">
+                <a16:creationId xmlns:a16="http://schemas.microsoft.com/office/drawing/2014/main" id="{6DE10E07-88B5-4E94-82B6-74C829BC0C6A}"/>
+              </a:ext>
+            </a:extLst>
+          </p:cNvPr>
+          <p:cNvPicPr>
+            <a:picLocks noGrp="1" noChangeAspect="1"/>
+          </p:cNvPicPr>
+          <p:nvPr>
+            <p:ph idx="1"/>
+          </p:nvPr>
+        </p:nvPicPr>
+        <p:blipFill>
+          <a:blip r:embed="rId2"/>
+          <a:stretch>
+            <a:fillRect/>
+          </a:stretch>
+        </p:blipFill>
+        <p:spPr>
+          <a:xfrm>
+            <a:off x="2827484" y="1103313"/>
+            <a:ext cx="1812634" cy="4509114"/>
+          </a:xfrm>
+        </p:spPr>
+      </p:pic>
+      <p:sp>
+        <p:nvSpPr>
+          <p:cNvPr id="4" name="Text Placeholder 3">
+            <a:extLst>
+              <a:ext uri="{FF2B5EF4-FFF2-40B4-BE49-F238E27FC236}">
+                <a16:creationId xmlns:a16="http://schemas.microsoft.com/office/drawing/2014/main" id="{B5EE5C92-441B-4385-87CB-19E7157F05FE}"/>
+              </a:ext>
+            </a:extLst>
+          </p:cNvPr>
+          <p:cNvSpPr>
+            <a:spLocks noGrp="1"/>
+          </p:cNvSpPr>
+          <p:nvPr>
+            <p:ph type="body" sz="half" idx="2"/>
+          </p:nvPr>
+        </p:nvSpPr>
+        <p:spPr/>
+        <p:txBody>
+          <a:bodyPr>
+            <a:normAutofit fontScale="47500" lnSpcReduction="20000"/>
+          </a:bodyPr>
+          <a:lstStyle/>
+          <a:p>
+            <a:pPr marL="285750" indent="-285750">
+              <a:buFont typeface="Arial" panose="020B0604020202020204" pitchFamily="34" charset="0"/>
+              <a:buChar char="•"/>
+            </a:pPr>
+            <a:r>
+              <a:rPr lang="en-AU" dirty="0"/>
+              <a:t>The tech stack showing how each part works together.</a:t>
+            </a:r>
+          </a:p>
+          <a:p>
+            <a:pPr marL="285750" indent="-285750">
+              <a:buFont typeface="Arial" panose="020B0604020202020204" pitchFamily="34" charset="0"/>
+              <a:buChar char="•"/>
+            </a:pPr>
+            <a:r>
+              <a:rPr lang="en-AU" dirty="0"/>
+              <a:t>HTML being the component summery, detailing each part of the site. Great care had to be taken to insure components are nested correctly in order to get ideal placement.</a:t>
+            </a:r>
+          </a:p>
+          <a:p>
+            <a:pPr marL="285750" indent="-285750">
+              <a:buFont typeface="Arial" panose="020B0604020202020204" pitchFamily="34" charset="0"/>
+              <a:buChar char="•"/>
+            </a:pPr>
+            <a:r>
+              <a:rPr lang="en-AU" dirty="0"/>
+              <a:t>The CSS is the styling sheet, a list of 5 colours where chosen to act as a complimenting design, consisting of an impure white as the primary colour of the page, and a deep black as the secondary. A neutral deep grey tertiary and a green accent. Probably used more than it should have been a accent complimentary red was chosen.</a:t>
+            </a:r>
+          </a:p>
+          <a:p>
+            <a:pPr marL="285750" indent="-285750">
+              <a:buFont typeface="Arial" panose="020B0604020202020204" pitchFamily="34" charset="0"/>
+              <a:buChar char="•"/>
+            </a:pPr>
+            <a:r>
+              <a:rPr lang="en-AU" dirty="0"/>
+              <a:t>With these 5 colours the sites scheme remained consistent and simplistic.</a:t>
+            </a:r>
+          </a:p>
+          <a:p>
+            <a:pPr marL="285750" indent="-285750">
+              <a:buFont typeface="Arial" panose="020B0604020202020204" pitchFamily="34" charset="0"/>
+              <a:buChar char="•"/>
+            </a:pPr>
+            <a:r>
+              <a:rPr lang="en-AU" dirty="0"/>
+              <a:t>Java Script through the help of </a:t>
+            </a:r>
+            <a:r>
+              <a:rPr lang="en-AU" dirty="0" err="1"/>
+              <a:t>JQuery</a:t>
+            </a:r>
+            <a:r>
+              <a:rPr lang="en-AU" dirty="0"/>
+              <a:t>, was used to add logic to the site, including button functionality, icon animation and navbar control.</a:t>
+            </a:r>
+          </a:p>
+          <a:p>
+            <a:pPr marL="285750" indent="-285750">
+              <a:buFont typeface="Arial" panose="020B0604020202020204" pitchFamily="34" charset="0"/>
+              <a:buChar char="•"/>
+            </a:pPr>
+            <a:r>
+              <a:rPr lang="en-AU" dirty="0"/>
+              <a:t>JS was also used to copy elements from other pages allowing blog posts to be displayed on the home.</a:t>
+            </a:r>
+          </a:p>
+        </p:txBody>
+      </p:sp>
+    </p:spTree>
+    <p:extLst>
+      <p:ext uri="{BB962C8B-B14F-4D97-AF65-F5344CB8AC3E}">
+        <p14:creationId xmlns:p14="http://schemas.microsoft.com/office/powerpoint/2010/main" val="2353842111"/>
+      </p:ext>
+    </p:extLst>
+  </p:cSld>
+  <p:clrMapOvr>
+    <a:masterClrMapping/>
+  </p:clrMapOvr>
+</p:sld>
+</file>
+
+<file path=ppt/slides/slide13.xml><?xml version="1.0" encoding="utf-8"?>
+<p:sld xmlns:a="http://schemas.openxmlformats.org/drawingml/2006/main" xmlns:r="http://schemas.openxmlformats.org/officeDocument/2006/relationships" xmlns:p="http://schemas.openxmlformats.org/presentationml/2006/main">
+  <p:cSld>
+    <p:spTree>
+      <p:nvGrpSpPr>
+        <p:cNvPr id="1" name=""/>
+        <p:cNvGrpSpPr/>
+        <p:nvPr/>
+      </p:nvGrpSpPr>
+      <p:grpSpPr>
+        <a:xfrm>
+          <a:off x="0" y="0"/>
+          <a:ext cx="0" cy="0"/>
+          <a:chOff x="0" y="0"/>
+          <a:chExt cx="0" cy="0"/>
+        </a:xfrm>
+      </p:grpSpPr>
+      <p:sp>
+        <p:nvSpPr>
+          <p:cNvPr id="2" name="Title 1">
+            <a:extLst>
+              <a:ext uri="{FF2B5EF4-FFF2-40B4-BE49-F238E27FC236}">
+                <a16:creationId xmlns:a16="http://schemas.microsoft.com/office/drawing/2014/main" id="{9B80D07C-E1ED-497E-9871-9C81B0E68AFF}"/>
+              </a:ext>
+            </a:extLst>
+          </p:cNvPr>
+          <p:cNvSpPr>
+            <a:spLocks noGrp="1"/>
+          </p:cNvSpPr>
+          <p:nvPr>
+            <p:ph type="title"/>
+          </p:nvPr>
+        </p:nvSpPr>
+        <p:spPr/>
+        <p:txBody>
+          <a:bodyPr/>
+          <a:lstStyle/>
+          <a:p>
+            <a:r>
+              <a:rPr lang="en-AU" dirty="0"/>
+              <a:t>The home of greatness.</a:t>
+            </a:r>
+          </a:p>
+        </p:txBody>
+      </p:sp>
+      <p:pic>
+        <p:nvPicPr>
+          <p:cNvPr id="6" name="Content Placeholder 5" descr="Graphical user interface, website&#10;&#10;Description automatically generated">
+            <a:extLst>
+              <a:ext uri="{FF2B5EF4-FFF2-40B4-BE49-F238E27FC236}">
+                <a16:creationId xmlns:a16="http://schemas.microsoft.com/office/drawing/2014/main" id="{D03783C1-B5FA-40FF-8F8E-CEEFFE1F83C4}"/>
+              </a:ext>
+            </a:extLst>
+          </p:cNvPr>
+          <p:cNvPicPr>
+            <a:picLocks noGrp="1" noChangeAspect="1"/>
+          </p:cNvPicPr>
+          <p:nvPr>
+            <p:ph idx="1"/>
+          </p:nvPr>
+        </p:nvPicPr>
+        <p:blipFill>
+          <a:blip r:embed="rId2"/>
+          <a:stretch>
+            <a:fillRect/>
+          </a:stretch>
+        </p:blipFill>
+        <p:spPr>
+          <a:xfrm>
+            <a:off x="1482811" y="609600"/>
+            <a:ext cx="5263978" cy="5334000"/>
+          </a:xfrm>
+        </p:spPr>
+      </p:pic>
+      <p:sp>
+        <p:nvSpPr>
+          <p:cNvPr id="4" name="Text Placeholder 3">
+            <a:extLst>
+              <a:ext uri="{FF2B5EF4-FFF2-40B4-BE49-F238E27FC236}">
+                <a16:creationId xmlns:a16="http://schemas.microsoft.com/office/drawing/2014/main" id="{F4FA6EE1-981E-43E5-A9E0-29E12A60DC25}"/>
+              </a:ext>
+            </a:extLst>
+          </p:cNvPr>
+          <p:cNvSpPr>
+            <a:spLocks noGrp="1"/>
+          </p:cNvSpPr>
+          <p:nvPr>
+            <p:ph type="body" sz="half" idx="2"/>
+          </p:nvPr>
+        </p:nvSpPr>
+        <p:spPr/>
+        <p:txBody>
+          <a:bodyPr>
+            <a:normAutofit fontScale="47500" lnSpcReduction="20000"/>
+          </a:bodyPr>
+          <a:lstStyle/>
+          <a:p>
+            <a:pPr marL="285750" indent="-285750">
+              <a:buFont typeface="Arial" panose="020B0604020202020204" pitchFamily="34" charset="0"/>
+              <a:buChar char="•"/>
+            </a:pPr>
+            <a:r>
+              <a:rPr lang="en-AU" dirty="0"/>
+              <a:t>The Home page. Puts 4 of the 5 colours to use, Site background consisting of the off white, keeping it muted but clean.</a:t>
+            </a:r>
+          </a:p>
+          <a:p>
+            <a:pPr marL="285750" indent="-285750">
+              <a:buFont typeface="Arial" panose="020B0604020202020204" pitchFamily="34" charset="0"/>
+              <a:buChar char="•"/>
+            </a:pPr>
+            <a:r>
+              <a:rPr lang="en-AU" dirty="0"/>
+              <a:t>Black standing out catches the eye and also separates the elements.</a:t>
+            </a:r>
+          </a:p>
+          <a:p>
+            <a:pPr marL="285750" indent="-285750">
+              <a:buFont typeface="Arial" panose="020B0604020202020204" pitchFamily="34" charset="0"/>
+              <a:buChar char="•"/>
+            </a:pPr>
+            <a:r>
+              <a:rPr lang="en-AU" dirty="0"/>
+              <a:t>Not immediately obvious, the text on the </a:t>
+            </a:r>
+            <a:r>
+              <a:rPr lang="en-AU" dirty="0" err="1"/>
+              <a:t>img</a:t>
+            </a:r>
+            <a:r>
+              <a:rPr lang="en-AU" dirty="0"/>
+              <a:t> background contains text shadow to help it standout, the shadow is the dark grey of the Tertiary.</a:t>
+            </a:r>
+          </a:p>
+          <a:p>
+            <a:pPr marL="285750" indent="-285750">
+              <a:buFont typeface="Arial" panose="020B0604020202020204" pitchFamily="34" charset="0"/>
+              <a:buChar char="•"/>
+            </a:pPr>
+            <a:r>
+              <a:rPr lang="en-AU" dirty="0"/>
+              <a:t>The green that highlights the active page stands out from the white and black allowing any user to easily identify the page they are on.</a:t>
+            </a:r>
+          </a:p>
+          <a:p>
+            <a:pPr marL="285750" indent="-285750">
+              <a:buFont typeface="Arial" panose="020B0604020202020204" pitchFamily="34" charset="0"/>
+              <a:buChar char="•"/>
+            </a:pPr>
+            <a:r>
+              <a:rPr lang="en-AU" dirty="0"/>
+              <a:t>The profile picture is a place holder however it being a brighter picture allows it to stand out on the darker background.</a:t>
+            </a:r>
+          </a:p>
+          <a:p>
+            <a:pPr marL="285750" indent="-285750">
+              <a:buFont typeface="Arial" panose="020B0604020202020204" pitchFamily="34" charset="0"/>
+              <a:buChar char="•"/>
+            </a:pPr>
+            <a:r>
+              <a:rPr lang="en-AU" dirty="0"/>
+              <a:t>Noticeable a design element has changed, a single blog post is visible, this is due to design changes made on the Blog Page, having a single ‘main’ post, which will be the latest post made allowing for easy viewing.</a:t>
+            </a:r>
+          </a:p>
+        </p:txBody>
+      </p:sp>
+    </p:spTree>
+    <p:extLst>
+      <p:ext uri="{BB962C8B-B14F-4D97-AF65-F5344CB8AC3E}">
+        <p14:creationId xmlns:p14="http://schemas.microsoft.com/office/powerpoint/2010/main" val="227641114"/>
+      </p:ext>
+    </p:extLst>
+  </p:cSld>
+  <p:clrMapOvr>
+    <a:masterClrMapping/>
+  </p:clrMapOvr>
+</p:sld>
+</file>
+
+<file path=ppt/slides/slide14.xml><?xml version="1.0" encoding="utf-8"?>
+<p:sld xmlns:a="http://schemas.openxmlformats.org/drawingml/2006/main" xmlns:r="http://schemas.openxmlformats.org/officeDocument/2006/relationships" xmlns:p="http://schemas.openxmlformats.org/presentationml/2006/main">
+  <p:cSld>
+    <p:spTree>
+      <p:nvGrpSpPr>
+        <p:cNvPr id="1" name=""/>
+        <p:cNvGrpSpPr/>
+        <p:nvPr/>
+      </p:nvGrpSpPr>
+      <p:grpSpPr>
+        <a:xfrm>
+          <a:off x="0" y="0"/>
+          <a:ext cx="0" cy="0"/>
+          <a:chOff x="0" y="0"/>
+          <a:chExt cx="0" cy="0"/>
+        </a:xfrm>
+      </p:grpSpPr>
+      <p:sp>
+        <p:nvSpPr>
+          <p:cNvPr id="2" name="Title 1">
+            <a:extLst>
+              <a:ext uri="{FF2B5EF4-FFF2-40B4-BE49-F238E27FC236}">
+                <a16:creationId xmlns:a16="http://schemas.microsoft.com/office/drawing/2014/main" id="{C45B50AF-8E72-458B-BF61-85120A0B8C38}"/>
+              </a:ext>
+            </a:extLst>
+          </p:cNvPr>
+          <p:cNvSpPr>
+            <a:spLocks noGrp="1"/>
+          </p:cNvSpPr>
+          <p:nvPr>
+            <p:ph type="title"/>
+          </p:nvPr>
+        </p:nvSpPr>
+        <p:spPr/>
+        <p:txBody>
+          <a:bodyPr/>
+          <a:lstStyle/>
+          <a:p>
+            <a:r>
+              <a:rPr lang="en-AU" dirty="0"/>
+              <a:t>Blogging is the future</a:t>
+            </a:r>
+          </a:p>
+        </p:txBody>
+      </p:sp>
+      <p:pic>
+        <p:nvPicPr>
+          <p:cNvPr id="6" name="Content Placeholder 5" descr="Graphical user interface, website&#10;&#10;Description automatically generated">
+            <a:extLst>
+              <a:ext uri="{FF2B5EF4-FFF2-40B4-BE49-F238E27FC236}">
+                <a16:creationId xmlns:a16="http://schemas.microsoft.com/office/drawing/2014/main" id="{0BA41B31-009E-4800-88DA-A983DB19827F}"/>
+              </a:ext>
+            </a:extLst>
+          </p:cNvPr>
+          <p:cNvPicPr>
+            <a:picLocks noGrp="1" noChangeAspect="1"/>
+          </p:cNvPicPr>
+          <p:nvPr>
+            <p:ph idx="1"/>
+          </p:nvPr>
+        </p:nvPicPr>
+        <p:blipFill>
+          <a:blip r:embed="rId2"/>
+          <a:stretch>
+            <a:fillRect/>
+          </a:stretch>
+        </p:blipFill>
+        <p:spPr>
+          <a:xfrm>
+            <a:off x="1468555" y="609600"/>
+            <a:ext cx="5292490" cy="5334000"/>
+          </a:xfrm>
+        </p:spPr>
+      </p:pic>
+      <p:sp>
+        <p:nvSpPr>
+          <p:cNvPr id="4" name="Text Placeholder 3">
+            <a:extLst>
+              <a:ext uri="{FF2B5EF4-FFF2-40B4-BE49-F238E27FC236}">
+                <a16:creationId xmlns:a16="http://schemas.microsoft.com/office/drawing/2014/main" id="{70A49642-E31F-400B-9825-2890994168AB}"/>
+              </a:ext>
+            </a:extLst>
+          </p:cNvPr>
+          <p:cNvSpPr>
+            <a:spLocks noGrp="1"/>
+          </p:cNvSpPr>
+          <p:nvPr>
+            <p:ph type="body" sz="half" idx="2"/>
+          </p:nvPr>
+        </p:nvSpPr>
+        <p:spPr/>
+        <p:txBody>
+          <a:bodyPr>
+            <a:normAutofit fontScale="77500" lnSpcReduction="20000"/>
+          </a:bodyPr>
+          <a:lstStyle/>
+          <a:p>
+            <a:pPr marL="285750" indent="-285750">
+              <a:buFont typeface="Arial" panose="020B0604020202020204" pitchFamily="34" charset="0"/>
+              <a:buChar char="•"/>
+            </a:pPr>
+            <a:r>
+              <a:rPr lang="en-AU" dirty="0"/>
+              <a:t>Similar to the Home, we have the off white background and black nav with green active page.</a:t>
+            </a:r>
+          </a:p>
+          <a:p>
+            <a:pPr marL="285750" indent="-285750">
+              <a:buFont typeface="Arial" panose="020B0604020202020204" pitchFamily="34" charset="0"/>
+              <a:buChar char="•"/>
+            </a:pPr>
+            <a:r>
+              <a:rPr lang="en-AU" dirty="0"/>
+              <a:t>The latest blog post will always be on top and larger than the older.</a:t>
+            </a:r>
+          </a:p>
+          <a:p>
+            <a:pPr marL="285750" indent="-285750">
+              <a:buFont typeface="Arial" panose="020B0604020202020204" pitchFamily="34" charset="0"/>
+              <a:buChar char="•"/>
+            </a:pPr>
+            <a:r>
+              <a:rPr lang="en-AU" dirty="0"/>
+              <a:t>I had neglected to add easy separation between the posts making everything look too uniform.</a:t>
+            </a:r>
+          </a:p>
+          <a:p>
+            <a:pPr marL="285750" indent="-285750">
+              <a:buFont typeface="Arial" panose="020B0604020202020204" pitchFamily="34" charset="0"/>
+              <a:buChar char="•"/>
+            </a:pPr>
+            <a:r>
+              <a:rPr lang="en-AU" dirty="0"/>
+              <a:t>In cases that an image fails to load the use of the accent complimentary comes through acting as a filler.</a:t>
+            </a:r>
+          </a:p>
+        </p:txBody>
+      </p:sp>
+    </p:spTree>
+    <p:extLst>
+      <p:ext uri="{BB962C8B-B14F-4D97-AF65-F5344CB8AC3E}">
+        <p14:creationId xmlns:p14="http://schemas.microsoft.com/office/powerpoint/2010/main" val="2658760969"/>
+      </p:ext>
+    </p:extLst>
+  </p:cSld>
+  <p:clrMapOvr>
+    <a:masterClrMapping/>
+  </p:clrMapOvr>
+</p:sld>
+</file>
+
+<file path=ppt/slides/slide15.xml><?xml version="1.0" encoding="utf-8"?>
+<p:sld xmlns:a="http://schemas.openxmlformats.org/drawingml/2006/main" xmlns:r="http://schemas.openxmlformats.org/officeDocument/2006/relationships" xmlns:p="http://schemas.openxmlformats.org/presentationml/2006/main">
+  <p:cSld>
+    <p:spTree>
+      <p:nvGrpSpPr>
+        <p:cNvPr id="1" name=""/>
+        <p:cNvGrpSpPr/>
+        <p:nvPr/>
+      </p:nvGrpSpPr>
+      <p:grpSpPr>
+        <a:xfrm>
+          <a:off x="0" y="0"/>
+          <a:ext cx="0" cy="0"/>
+          <a:chOff x="0" y="0"/>
+          <a:chExt cx="0" cy="0"/>
+        </a:xfrm>
+      </p:grpSpPr>
+      <p:sp>
+        <p:nvSpPr>
+          <p:cNvPr id="2" name="Title 1">
+            <a:extLst>
+              <a:ext uri="{FF2B5EF4-FFF2-40B4-BE49-F238E27FC236}">
+                <a16:creationId xmlns:a16="http://schemas.microsoft.com/office/drawing/2014/main" id="{99F176E5-C266-4E57-9F86-B484E57EDFC3}"/>
+              </a:ext>
+            </a:extLst>
+          </p:cNvPr>
+          <p:cNvSpPr>
+            <a:spLocks noGrp="1"/>
+          </p:cNvSpPr>
+          <p:nvPr>
+            <p:ph type="title"/>
+          </p:nvPr>
+        </p:nvSpPr>
+        <p:spPr/>
+        <p:txBody>
+          <a:bodyPr/>
+          <a:lstStyle/>
+          <a:p>
+            <a:r>
+              <a:rPr lang="en-AU" dirty="0"/>
+              <a:t>We </a:t>
+            </a:r>
+            <a:r>
+              <a:rPr lang="en-AU" dirty="0" err="1"/>
+              <a:t>gotta</a:t>
+            </a:r>
+            <a:r>
+              <a:rPr lang="en-AU" dirty="0"/>
+              <a:t> make contact.</a:t>
+            </a:r>
+          </a:p>
+        </p:txBody>
+      </p:sp>
+      <p:pic>
+        <p:nvPicPr>
+          <p:cNvPr id="6" name="Content Placeholder 5" descr="Graphical user interface, text, application&#10;&#10;Description automatically generated">
+            <a:extLst>
+              <a:ext uri="{FF2B5EF4-FFF2-40B4-BE49-F238E27FC236}">
+                <a16:creationId xmlns:a16="http://schemas.microsoft.com/office/drawing/2014/main" id="{93FBC8D4-4651-499E-8719-41C78465D5FE}"/>
+              </a:ext>
+            </a:extLst>
+          </p:cNvPr>
+          <p:cNvPicPr>
+            <a:picLocks noGrp="1" noChangeAspect="1"/>
+          </p:cNvPicPr>
+          <p:nvPr>
+            <p:ph idx="1"/>
+          </p:nvPr>
+        </p:nvPicPr>
+        <p:blipFill>
+          <a:blip r:embed="rId2"/>
+          <a:stretch>
+            <a:fillRect/>
+          </a:stretch>
+        </p:blipFill>
+        <p:spPr>
+          <a:xfrm>
+            <a:off x="1127292" y="609600"/>
+            <a:ext cx="5975015" cy="5334000"/>
+          </a:xfrm>
+        </p:spPr>
+      </p:pic>
+      <p:sp>
+        <p:nvSpPr>
+          <p:cNvPr id="4" name="Text Placeholder 3">
+            <a:extLst>
+              <a:ext uri="{FF2B5EF4-FFF2-40B4-BE49-F238E27FC236}">
+                <a16:creationId xmlns:a16="http://schemas.microsoft.com/office/drawing/2014/main" id="{438E9BD8-AD27-4B6E-B1EB-4D9DF6222253}"/>
+              </a:ext>
+            </a:extLst>
+          </p:cNvPr>
+          <p:cNvSpPr>
+            <a:spLocks noGrp="1"/>
+          </p:cNvSpPr>
+          <p:nvPr>
+            <p:ph type="body" sz="half" idx="2"/>
+          </p:nvPr>
+        </p:nvSpPr>
+        <p:spPr/>
+        <p:txBody>
+          <a:bodyPr>
+            <a:normAutofit lnSpcReduction="10000"/>
+          </a:bodyPr>
+          <a:lstStyle/>
+          <a:p>
+            <a:pPr marL="285750" indent="-285750">
+              <a:buFont typeface="Arial" panose="020B0604020202020204" pitchFamily="34" charset="0"/>
+              <a:buChar char="•"/>
+            </a:pPr>
+            <a:r>
+              <a:rPr lang="en-AU" dirty="0"/>
+              <a:t>This image is slightly outdated, as the form page itself is missing that off white background.</a:t>
+            </a:r>
+          </a:p>
+          <a:p>
+            <a:pPr marL="285750" indent="-285750">
+              <a:buFont typeface="Arial" panose="020B0604020202020204" pitchFamily="34" charset="0"/>
+              <a:buChar char="•"/>
+            </a:pPr>
+            <a:r>
+              <a:rPr lang="en-AU" dirty="0"/>
+              <a:t>Kept the page simple as to avoid distractions.</a:t>
+            </a:r>
+          </a:p>
+          <a:p>
+            <a:pPr marL="285750" indent="-285750">
+              <a:buFont typeface="Arial" panose="020B0604020202020204" pitchFamily="34" charset="0"/>
+              <a:buChar char="•"/>
+            </a:pPr>
+            <a:r>
+              <a:rPr lang="en-AU" dirty="0"/>
+              <a:t>The footer is on display here as you can see the links to </a:t>
+            </a:r>
+            <a:r>
+              <a:rPr lang="en-AU" dirty="0" err="1"/>
+              <a:t>Github</a:t>
+            </a:r>
+            <a:r>
+              <a:rPr lang="en-AU" dirty="0"/>
+              <a:t>, Linked in, and the owners Email.</a:t>
+            </a:r>
+          </a:p>
+        </p:txBody>
+      </p:sp>
+    </p:spTree>
+    <p:extLst>
+      <p:ext uri="{BB962C8B-B14F-4D97-AF65-F5344CB8AC3E}">
+        <p14:creationId xmlns:p14="http://schemas.microsoft.com/office/powerpoint/2010/main" val="1073652921"/>
+      </p:ext>
+    </p:extLst>
+  </p:cSld>
+  <p:clrMapOvr>
+    <a:masterClrMapping/>
+  </p:clrMapOvr>
+</p:sld>
+</file>
+
 <file path=ppt/slides/slide2.xml><?xml version="1.0" encoding="utf-8"?>
 <p:sld xmlns:a="http://schemas.openxmlformats.org/drawingml/2006/main" xmlns:r="http://schemas.openxmlformats.org/officeDocument/2006/relationships" xmlns:p="http://schemas.openxmlformats.org/presentationml/2006/main">
   <p:cSld>
@@ -7534,7 +8478,7 @@
             </a:pPr>
             <a:r>
               <a:rPr lang="en-AU" dirty="0"/>
-              <a:t>Index contains basic overview of each page.</a:t>
+              <a:t>Index contains basic introduction and latest blog post</a:t>
             </a:r>
           </a:p>
           <a:p>
@@ -7544,7 +8488,7 @@
             </a:pPr>
             <a:r>
               <a:rPr lang="en-AU" dirty="0"/>
-              <a:t>Each page goes into further detail related to their name.</a:t>
+              <a:t>Each page contains details related to their name. </a:t>
             </a:r>
             <a:endParaRPr lang="en-US" dirty="0"/>
           </a:p>
@@ -7554,6 +8498,874 @@
     <p:extLst>
       <p:ext uri="{BB962C8B-B14F-4D97-AF65-F5344CB8AC3E}">
         <p14:creationId xmlns:p14="http://schemas.microsoft.com/office/powerpoint/2010/main" val="15108006"/>
+      </p:ext>
+    </p:extLst>
+  </p:cSld>
+  <p:clrMapOvr>
+    <a:masterClrMapping/>
+  </p:clrMapOvr>
+</p:sld>
+</file>
+
+<file path=ppt/slides/slide5.xml><?xml version="1.0" encoding="utf-8"?>
+<p:sld xmlns:a="http://schemas.openxmlformats.org/drawingml/2006/main" xmlns:r="http://schemas.openxmlformats.org/officeDocument/2006/relationships" xmlns:p="http://schemas.openxmlformats.org/presentationml/2006/main">
+  <p:cSld>
+    <p:spTree>
+      <p:nvGrpSpPr>
+        <p:cNvPr id="1" name=""/>
+        <p:cNvGrpSpPr/>
+        <p:nvPr/>
+      </p:nvGrpSpPr>
+      <p:grpSpPr>
+        <a:xfrm>
+          <a:off x="0" y="0"/>
+          <a:ext cx="0" cy="0"/>
+          <a:chOff x="0" y="0"/>
+          <a:chExt cx="0" cy="0"/>
+        </a:xfrm>
+      </p:grpSpPr>
+      <p:sp>
+        <p:nvSpPr>
+          <p:cNvPr id="2" name="Title 1">
+            <a:extLst>
+              <a:ext uri="{FF2B5EF4-FFF2-40B4-BE49-F238E27FC236}">
+                <a16:creationId xmlns:a16="http://schemas.microsoft.com/office/drawing/2014/main" id="{F986BF3F-596B-46A9-B6FC-7D318D86B0A2}"/>
+              </a:ext>
+            </a:extLst>
+          </p:cNvPr>
+          <p:cNvSpPr>
+            <a:spLocks noGrp="1"/>
+          </p:cNvSpPr>
+          <p:nvPr>
+            <p:ph type="title"/>
+          </p:nvPr>
+        </p:nvSpPr>
+        <p:spPr/>
+        <p:txBody>
+          <a:bodyPr/>
+          <a:lstStyle/>
+          <a:p>
+            <a:r>
+              <a:rPr lang="en-AU" dirty="0"/>
+              <a:t>How was it going to look?</a:t>
+            </a:r>
+          </a:p>
+        </p:txBody>
+      </p:sp>
+      <p:sp>
+        <p:nvSpPr>
+          <p:cNvPr id="3" name="Text Placeholder 2">
+            <a:extLst>
+              <a:ext uri="{FF2B5EF4-FFF2-40B4-BE49-F238E27FC236}">
+                <a16:creationId xmlns:a16="http://schemas.microsoft.com/office/drawing/2014/main" id="{58F493C4-0812-4496-842A-26E75933F4AB}"/>
+              </a:ext>
+            </a:extLst>
+          </p:cNvPr>
+          <p:cNvSpPr>
+            <a:spLocks noGrp="1"/>
+          </p:cNvSpPr>
+          <p:nvPr>
+            <p:ph type="body" idx="1"/>
+          </p:nvPr>
+        </p:nvSpPr>
+        <p:spPr/>
+        <p:txBody>
+          <a:bodyPr/>
+          <a:lstStyle/>
+          <a:p>
+            <a:r>
+              <a:rPr lang="en-AU" dirty="0"/>
+              <a:t>How was each page intended to look?</a:t>
+            </a:r>
+          </a:p>
+        </p:txBody>
+      </p:sp>
+    </p:spTree>
+    <p:extLst>
+      <p:ext uri="{BB962C8B-B14F-4D97-AF65-F5344CB8AC3E}">
+        <p14:creationId xmlns:p14="http://schemas.microsoft.com/office/powerpoint/2010/main" val="4139597056"/>
+      </p:ext>
+    </p:extLst>
+  </p:cSld>
+  <p:clrMapOvr>
+    <a:masterClrMapping/>
+  </p:clrMapOvr>
+</p:sld>
+</file>
+
+<file path=ppt/slides/slide6.xml><?xml version="1.0" encoding="utf-8"?>
+<p:sld xmlns:a="http://schemas.openxmlformats.org/drawingml/2006/main" xmlns:r="http://schemas.openxmlformats.org/officeDocument/2006/relationships" xmlns:p="http://schemas.openxmlformats.org/presentationml/2006/main">
+  <p:cSld>
+    <p:spTree>
+      <p:nvGrpSpPr>
+        <p:cNvPr id="1" name=""/>
+        <p:cNvGrpSpPr/>
+        <p:nvPr/>
+      </p:nvGrpSpPr>
+      <p:grpSpPr>
+        <a:xfrm>
+          <a:off x="0" y="0"/>
+          <a:ext cx="0" cy="0"/>
+          <a:chOff x="0" y="0"/>
+          <a:chExt cx="0" cy="0"/>
+        </a:xfrm>
+      </p:grpSpPr>
+      <p:sp>
+        <p:nvSpPr>
+          <p:cNvPr id="2" name="Title 1">
+            <a:extLst>
+              <a:ext uri="{FF2B5EF4-FFF2-40B4-BE49-F238E27FC236}">
+                <a16:creationId xmlns:a16="http://schemas.microsoft.com/office/drawing/2014/main" id="{C1186405-CD9C-4AFC-9363-4BAD2C651C0B}"/>
+              </a:ext>
+            </a:extLst>
+          </p:cNvPr>
+          <p:cNvSpPr>
+            <a:spLocks noGrp="1"/>
+          </p:cNvSpPr>
+          <p:nvPr>
+            <p:ph type="title"/>
+          </p:nvPr>
+        </p:nvSpPr>
+        <p:spPr/>
+        <p:txBody>
+          <a:bodyPr/>
+          <a:lstStyle/>
+          <a:p>
+            <a:r>
+              <a:rPr lang="en-AU" dirty="0"/>
+              <a:t>Welcome to the Index page</a:t>
+            </a:r>
+          </a:p>
+        </p:txBody>
+      </p:sp>
+      <p:sp>
+        <p:nvSpPr>
+          <p:cNvPr id="3" name="Content Placeholder 2">
+            <a:extLst>
+              <a:ext uri="{FF2B5EF4-FFF2-40B4-BE49-F238E27FC236}">
+                <a16:creationId xmlns:a16="http://schemas.microsoft.com/office/drawing/2014/main" id="{FDA58762-7901-4978-BA2E-14D01A08ACF4}"/>
+              </a:ext>
+            </a:extLst>
+          </p:cNvPr>
+          <p:cNvSpPr>
+            <a:spLocks noGrp="1"/>
+          </p:cNvSpPr>
+          <p:nvPr>
+            <p:ph idx="1"/>
+          </p:nvPr>
+        </p:nvSpPr>
+        <p:spPr/>
+        <p:txBody>
+          <a:bodyPr/>
+          <a:lstStyle/>
+          <a:p>
+            <a:endParaRPr lang="en-AU"/>
+          </a:p>
+        </p:txBody>
+      </p:sp>
+      <p:sp>
+        <p:nvSpPr>
+          <p:cNvPr id="4" name="Text Placeholder 3">
+            <a:extLst>
+              <a:ext uri="{FF2B5EF4-FFF2-40B4-BE49-F238E27FC236}">
+                <a16:creationId xmlns:a16="http://schemas.microsoft.com/office/drawing/2014/main" id="{B8F1EDAA-E9EA-4945-9796-A5BAEB02B017}"/>
+              </a:ext>
+            </a:extLst>
+          </p:cNvPr>
+          <p:cNvSpPr>
+            <a:spLocks noGrp="1"/>
+          </p:cNvSpPr>
+          <p:nvPr>
+            <p:ph type="body" sz="half" idx="2"/>
+          </p:nvPr>
+        </p:nvSpPr>
+        <p:spPr/>
+        <p:txBody>
+          <a:bodyPr>
+            <a:normAutofit fontScale="47500" lnSpcReduction="20000"/>
+          </a:bodyPr>
+          <a:lstStyle/>
+          <a:p>
+            <a:pPr marL="285750" indent="-285750">
+              <a:buFont typeface="Arial" panose="020B0604020202020204" pitchFamily="34" charset="0"/>
+              <a:buChar char="•"/>
+            </a:pPr>
+            <a:r>
+              <a:rPr lang="en-AU" dirty="0"/>
+              <a:t>3 Elements remain consistent throughout site design, the Header, which identifies what the site is, and who it is for. And the nav bar which displayed the current page to the left, and all available pages to the right.</a:t>
+            </a:r>
+          </a:p>
+          <a:p>
+            <a:pPr marL="285750" indent="-285750">
+              <a:buFont typeface="Arial" panose="020B0604020202020204" pitchFamily="34" charset="0"/>
+              <a:buChar char="•"/>
+            </a:pPr>
+            <a:r>
+              <a:rPr lang="en-AU" dirty="0"/>
+              <a:t>The Home page will contain a background image on top of which sits a picture of the site owner and a very short description of the owner.</a:t>
+            </a:r>
+          </a:p>
+          <a:p>
+            <a:pPr marL="285750" indent="-285750">
+              <a:buFont typeface="Arial" panose="020B0604020202020204" pitchFamily="34" charset="0"/>
+              <a:buChar char="•"/>
+            </a:pPr>
+            <a:r>
+              <a:rPr lang="en-AU" dirty="0"/>
+              <a:t>Below sits more text identifying the purpose of the site in more detail.</a:t>
+            </a:r>
+          </a:p>
+          <a:p>
+            <a:pPr marL="285750" indent="-285750">
+              <a:buFont typeface="Arial" panose="020B0604020202020204" pitchFamily="34" charset="0"/>
+              <a:buChar char="•"/>
+            </a:pPr>
+            <a:r>
+              <a:rPr lang="en-AU" dirty="0"/>
+              <a:t>Last element of the page is one it shares with the Blog, intending to display the last 4 blog posts made.</a:t>
+            </a:r>
+          </a:p>
+          <a:p>
+            <a:pPr marL="285750" indent="-285750">
+              <a:buFont typeface="Arial" panose="020B0604020202020204" pitchFamily="34" charset="0"/>
+              <a:buChar char="•"/>
+            </a:pPr>
+            <a:r>
+              <a:rPr lang="en-AU" dirty="0"/>
+              <a:t>The final shared element that isn’t shown is the footer which would contain links to </a:t>
+            </a:r>
+            <a:r>
+              <a:rPr lang="en-AU" dirty="0" err="1"/>
+              <a:t>Github</a:t>
+            </a:r>
+            <a:r>
+              <a:rPr lang="en-AU" dirty="0"/>
+              <a:t>, </a:t>
+            </a:r>
+            <a:r>
+              <a:rPr lang="en-AU" dirty="0" err="1"/>
+              <a:t>Linkedin</a:t>
+            </a:r>
+            <a:r>
+              <a:rPr lang="en-AU" dirty="0"/>
+              <a:t> and my email.</a:t>
+            </a:r>
+          </a:p>
+          <a:p>
+            <a:pPr marL="285750" indent="-285750">
+              <a:buFont typeface="Arial" panose="020B0604020202020204" pitchFamily="34" charset="0"/>
+              <a:buChar char="•"/>
+            </a:pPr>
+            <a:r>
+              <a:rPr lang="en-AU" dirty="0"/>
+              <a:t>All these combined makes the home page the ideal location for about everything, getting an idea of who the owner is, what you can except from the site and even view some of the blogs to get an idea of what recent projects the owner has been working on.</a:t>
+            </a:r>
+          </a:p>
+        </p:txBody>
+      </p:sp>
+      <p:pic>
+        <p:nvPicPr>
+          <p:cNvPr id="6" name="Picture 5">
+            <a:extLst>
+              <a:ext uri="{FF2B5EF4-FFF2-40B4-BE49-F238E27FC236}">
+                <a16:creationId xmlns:a16="http://schemas.microsoft.com/office/drawing/2014/main" id="{096A74D2-A424-4C08-9B16-643225840F4B}"/>
+              </a:ext>
+            </a:extLst>
+          </p:cNvPr>
+          <p:cNvPicPr>
+            <a:picLocks noChangeAspect="1"/>
+          </p:cNvPicPr>
+          <p:nvPr/>
+        </p:nvPicPr>
+        <p:blipFill>
+          <a:blip r:embed="rId2"/>
+          <a:stretch>
+            <a:fillRect/>
+          </a:stretch>
+        </p:blipFill>
+        <p:spPr>
+          <a:xfrm>
+            <a:off x="685800" y="1227975"/>
+            <a:ext cx="6858000" cy="4097250"/>
+          </a:xfrm>
+          <a:prstGeom prst="rect">
+            <a:avLst/>
+          </a:prstGeom>
+        </p:spPr>
+      </p:pic>
+    </p:spTree>
+    <p:extLst>
+      <p:ext uri="{BB962C8B-B14F-4D97-AF65-F5344CB8AC3E}">
+        <p14:creationId xmlns:p14="http://schemas.microsoft.com/office/powerpoint/2010/main" val="2410000139"/>
+      </p:ext>
+    </p:extLst>
+  </p:cSld>
+  <p:clrMapOvr>
+    <a:masterClrMapping/>
+  </p:clrMapOvr>
+</p:sld>
+</file>
+
+<file path=ppt/slides/slide7.xml><?xml version="1.0" encoding="utf-8"?>
+<p:sld xmlns:a="http://schemas.openxmlformats.org/drawingml/2006/main" xmlns:r="http://schemas.openxmlformats.org/officeDocument/2006/relationships" xmlns:p="http://schemas.openxmlformats.org/presentationml/2006/main">
+  <p:cSld>
+    <p:spTree>
+      <p:nvGrpSpPr>
+        <p:cNvPr id="1" name=""/>
+        <p:cNvGrpSpPr/>
+        <p:nvPr/>
+      </p:nvGrpSpPr>
+      <p:grpSpPr>
+        <a:xfrm>
+          <a:off x="0" y="0"/>
+          <a:ext cx="0" cy="0"/>
+          <a:chOff x="0" y="0"/>
+          <a:chExt cx="0" cy="0"/>
+        </a:xfrm>
+      </p:grpSpPr>
+      <p:sp>
+        <p:nvSpPr>
+          <p:cNvPr id="2" name="Title 1">
+            <a:extLst>
+              <a:ext uri="{FF2B5EF4-FFF2-40B4-BE49-F238E27FC236}">
+                <a16:creationId xmlns:a16="http://schemas.microsoft.com/office/drawing/2014/main" id="{EB806375-6425-4BD2-B00C-1A03128F8CE1}"/>
+              </a:ext>
+            </a:extLst>
+          </p:cNvPr>
+          <p:cNvSpPr>
+            <a:spLocks noGrp="1"/>
+          </p:cNvSpPr>
+          <p:nvPr>
+            <p:ph type="title"/>
+          </p:nvPr>
+        </p:nvSpPr>
+        <p:spPr/>
+        <p:txBody>
+          <a:bodyPr/>
+          <a:lstStyle/>
+          <a:p>
+            <a:r>
+              <a:rPr lang="en-AU" dirty="0"/>
+              <a:t>So we blogging today?</a:t>
+            </a:r>
+          </a:p>
+        </p:txBody>
+      </p:sp>
+      <p:sp>
+        <p:nvSpPr>
+          <p:cNvPr id="3" name="Content Placeholder 2">
+            <a:extLst>
+              <a:ext uri="{FF2B5EF4-FFF2-40B4-BE49-F238E27FC236}">
+                <a16:creationId xmlns:a16="http://schemas.microsoft.com/office/drawing/2014/main" id="{4AE70229-6A19-40E2-9287-328F7E698A5B}"/>
+              </a:ext>
+            </a:extLst>
+          </p:cNvPr>
+          <p:cNvSpPr>
+            <a:spLocks noGrp="1"/>
+          </p:cNvSpPr>
+          <p:nvPr>
+            <p:ph idx="1"/>
+          </p:nvPr>
+        </p:nvSpPr>
+        <p:spPr/>
+        <p:txBody>
+          <a:bodyPr/>
+          <a:lstStyle/>
+          <a:p>
+            <a:endParaRPr lang="en-AU"/>
+          </a:p>
+        </p:txBody>
+      </p:sp>
+      <p:sp>
+        <p:nvSpPr>
+          <p:cNvPr id="4" name="Text Placeholder 3">
+            <a:extLst>
+              <a:ext uri="{FF2B5EF4-FFF2-40B4-BE49-F238E27FC236}">
+                <a16:creationId xmlns:a16="http://schemas.microsoft.com/office/drawing/2014/main" id="{98BF30F0-F0BC-4D17-B331-46241D4C7515}"/>
+              </a:ext>
+            </a:extLst>
+          </p:cNvPr>
+          <p:cNvSpPr>
+            <a:spLocks noGrp="1"/>
+          </p:cNvSpPr>
+          <p:nvPr>
+            <p:ph type="body" sz="half" idx="2"/>
+          </p:nvPr>
+        </p:nvSpPr>
+        <p:spPr/>
+        <p:txBody>
+          <a:bodyPr>
+            <a:normAutofit fontScale="55000" lnSpcReduction="20000"/>
+          </a:bodyPr>
+          <a:lstStyle/>
+          <a:p>
+            <a:pPr marL="285750" indent="-285750">
+              <a:buFont typeface="Arial" panose="020B0604020202020204" pitchFamily="34" charset="0"/>
+              <a:buChar char="•"/>
+            </a:pPr>
+            <a:r>
+              <a:rPr lang="en-AU" dirty="0"/>
+              <a:t>The Blog page was a simple one, meant to display each blog side by side and a 2xX format.</a:t>
+            </a:r>
+          </a:p>
+          <a:p>
+            <a:pPr marL="285750" indent="-285750">
+              <a:buFont typeface="Arial" panose="020B0604020202020204" pitchFamily="34" charset="0"/>
+              <a:buChar char="•"/>
+            </a:pPr>
+            <a:r>
+              <a:rPr lang="en-AU" dirty="0"/>
+              <a:t>Containing all 3 shared elements, the footer is also on display.</a:t>
+            </a:r>
+          </a:p>
+          <a:p>
+            <a:pPr marL="285750" indent="-285750">
+              <a:buFont typeface="Arial" panose="020B0604020202020204" pitchFamily="34" charset="0"/>
+              <a:buChar char="•"/>
+            </a:pPr>
+            <a:r>
+              <a:rPr lang="en-AU" dirty="0"/>
+              <a:t>It would contain a blog header identifying that this page is indeed the blog and also maybe make a small joke.</a:t>
+            </a:r>
+          </a:p>
+          <a:p>
+            <a:pPr marL="285750" indent="-285750">
+              <a:buFont typeface="Arial" panose="020B0604020202020204" pitchFamily="34" charset="0"/>
+              <a:buChar char="•"/>
+            </a:pPr>
+            <a:r>
+              <a:rPr lang="en-AU" dirty="0"/>
+              <a:t>The individual blogs where intended to be small summaries that when clicked on would open up into larger more detailed blog pages that would cover the whole page.</a:t>
+            </a:r>
+          </a:p>
+          <a:p>
+            <a:pPr marL="285750" indent="-285750">
+              <a:buFont typeface="Arial" panose="020B0604020202020204" pitchFamily="34" charset="0"/>
+              <a:buChar char="•"/>
+            </a:pPr>
+            <a:r>
+              <a:rPr lang="en-AU" dirty="0"/>
+              <a:t>Not displayed but each thumbnail would be an image which the blog title and post date displayed on top.</a:t>
+            </a:r>
+          </a:p>
+          <a:p>
+            <a:pPr marL="285750" indent="-285750">
+              <a:buFont typeface="Arial" panose="020B0604020202020204" pitchFamily="34" charset="0"/>
+              <a:buChar char="•"/>
+            </a:pPr>
+            <a:r>
+              <a:rPr lang="en-AU" dirty="0"/>
+              <a:t>The blog header would lighten the mood, displaying a bit of the owners personality, while also being quick to navigate keeping everything confined until investigated further.</a:t>
+            </a:r>
+          </a:p>
+        </p:txBody>
+      </p:sp>
+      <p:pic>
+        <p:nvPicPr>
+          <p:cNvPr id="6" name="Picture 5">
+            <a:extLst>
+              <a:ext uri="{FF2B5EF4-FFF2-40B4-BE49-F238E27FC236}">
+                <a16:creationId xmlns:a16="http://schemas.microsoft.com/office/drawing/2014/main" id="{FE611F13-7917-482F-A067-B4C98FA48044}"/>
+              </a:ext>
+            </a:extLst>
+          </p:cNvPr>
+          <p:cNvPicPr>
+            <a:picLocks noChangeAspect="1"/>
+          </p:cNvPicPr>
+          <p:nvPr/>
+        </p:nvPicPr>
+        <p:blipFill>
+          <a:blip r:embed="rId2"/>
+          <a:stretch>
+            <a:fillRect/>
+          </a:stretch>
+        </p:blipFill>
+        <p:spPr>
+          <a:xfrm>
+            <a:off x="685799" y="1465779"/>
+            <a:ext cx="6858001" cy="3621641"/>
+          </a:xfrm>
+          <a:prstGeom prst="rect">
+            <a:avLst/>
+          </a:prstGeom>
+        </p:spPr>
+      </p:pic>
+    </p:spTree>
+    <p:extLst>
+      <p:ext uri="{BB962C8B-B14F-4D97-AF65-F5344CB8AC3E}">
+        <p14:creationId xmlns:p14="http://schemas.microsoft.com/office/powerpoint/2010/main" val="4056100521"/>
+      </p:ext>
+    </p:extLst>
+  </p:cSld>
+  <p:clrMapOvr>
+    <a:masterClrMapping/>
+  </p:clrMapOvr>
+</p:sld>
+</file>
+
+<file path=ppt/slides/slide8.xml><?xml version="1.0" encoding="utf-8"?>
+<p:sld xmlns:a="http://schemas.openxmlformats.org/drawingml/2006/main" xmlns:r="http://schemas.openxmlformats.org/officeDocument/2006/relationships" xmlns:p="http://schemas.openxmlformats.org/presentationml/2006/main">
+  <p:cSld>
+    <p:spTree>
+      <p:nvGrpSpPr>
+        <p:cNvPr id="1" name=""/>
+        <p:cNvGrpSpPr/>
+        <p:nvPr/>
+      </p:nvGrpSpPr>
+      <p:grpSpPr>
+        <a:xfrm>
+          <a:off x="0" y="0"/>
+          <a:ext cx="0" cy="0"/>
+          <a:chOff x="0" y="0"/>
+          <a:chExt cx="0" cy="0"/>
+        </a:xfrm>
+      </p:grpSpPr>
+      <p:sp>
+        <p:nvSpPr>
+          <p:cNvPr id="2" name="Title 1">
+            <a:extLst>
+              <a:ext uri="{FF2B5EF4-FFF2-40B4-BE49-F238E27FC236}">
+                <a16:creationId xmlns:a16="http://schemas.microsoft.com/office/drawing/2014/main" id="{7B11CB45-323A-434A-A558-FD6A56759B4B}"/>
+              </a:ext>
+            </a:extLst>
+          </p:cNvPr>
+          <p:cNvSpPr>
+            <a:spLocks noGrp="1"/>
+          </p:cNvSpPr>
+          <p:nvPr>
+            <p:ph type="title"/>
+          </p:nvPr>
+        </p:nvSpPr>
+        <p:spPr/>
+        <p:txBody>
+          <a:bodyPr/>
+          <a:lstStyle/>
+          <a:p>
+            <a:r>
+              <a:rPr lang="en-AU" dirty="0"/>
+              <a:t>What’s the work </a:t>
+            </a:r>
+            <a:r>
+              <a:rPr lang="en-AU" dirty="0" err="1"/>
+              <a:t>sitch</a:t>
+            </a:r>
+            <a:r>
+              <a:rPr lang="en-AU" dirty="0"/>
+              <a:t> like?</a:t>
+            </a:r>
+          </a:p>
+        </p:txBody>
+      </p:sp>
+      <p:sp>
+        <p:nvSpPr>
+          <p:cNvPr id="3" name="Content Placeholder 2">
+            <a:extLst>
+              <a:ext uri="{FF2B5EF4-FFF2-40B4-BE49-F238E27FC236}">
+                <a16:creationId xmlns:a16="http://schemas.microsoft.com/office/drawing/2014/main" id="{DA30D8AF-8580-4DCC-87BA-83F28D045335}"/>
+              </a:ext>
+            </a:extLst>
+          </p:cNvPr>
+          <p:cNvSpPr>
+            <a:spLocks noGrp="1"/>
+          </p:cNvSpPr>
+          <p:nvPr>
+            <p:ph idx="1"/>
+          </p:nvPr>
+        </p:nvSpPr>
+        <p:spPr/>
+        <p:txBody>
+          <a:bodyPr/>
+          <a:lstStyle/>
+          <a:p>
+            <a:endParaRPr lang="en-AU"/>
+          </a:p>
+        </p:txBody>
+      </p:sp>
+      <p:sp>
+        <p:nvSpPr>
+          <p:cNvPr id="4" name="Text Placeholder 3">
+            <a:extLst>
+              <a:ext uri="{FF2B5EF4-FFF2-40B4-BE49-F238E27FC236}">
+                <a16:creationId xmlns:a16="http://schemas.microsoft.com/office/drawing/2014/main" id="{B2A93126-0376-45AE-A859-D74F686FEA95}"/>
+              </a:ext>
+            </a:extLst>
+          </p:cNvPr>
+          <p:cNvSpPr>
+            <a:spLocks noGrp="1"/>
+          </p:cNvSpPr>
+          <p:nvPr>
+            <p:ph type="body" sz="half" idx="2"/>
+          </p:nvPr>
+        </p:nvSpPr>
+        <p:spPr/>
+        <p:txBody>
+          <a:bodyPr>
+            <a:normAutofit fontScale="62500" lnSpcReduction="20000"/>
+          </a:bodyPr>
+          <a:lstStyle/>
+          <a:p>
+            <a:pPr marL="285750" indent="-285750">
+              <a:buFont typeface="Arial" panose="020B0604020202020204" pitchFamily="34" charset="0"/>
+              <a:buChar char="•"/>
+            </a:pPr>
+            <a:r>
+              <a:rPr lang="en-AU" dirty="0"/>
+              <a:t>The Past project section, this page contains a summery of all past projects undertaken by the owner.</a:t>
+            </a:r>
+          </a:p>
+          <a:p>
+            <a:pPr marL="285750" indent="-285750">
+              <a:buFont typeface="Arial" panose="020B0604020202020204" pitchFamily="34" charset="0"/>
+              <a:buChar char="•"/>
+            </a:pPr>
+            <a:r>
+              <a:rPr lang="en-AU" dirty="0"/>
+              <a:t>Originally limited as the owners career progresses it is designed to be easily added to.</a:t>
+            </a:r>
+          </a:p>
+          <a:p>
+            <a:pPr marL="285750" indent="-285750">
+              <a:buFont typeface="Arial" panose="020B0604020202020204" pitchFamily="34" charset="0"/>
+              <a:buChar char="•"/>
+            </a:pPr>
+            <a:r>
+              <a:rPr lang="en-AU" dirty="0"/>
+              <a:t>Containing a picture to summarise the work, as we all know a picture can speak a thousand words, and next to it a summery of the project and skills used during it.</a:t>
+            </a:r>
+          </a:p>
+          <a:p>
+            <a:pPr marL="285750" indent="-285750">
+              <a:buFont typeface="Arial" panose="020B0604020202020204" pitchFamily="34" charset="0"/>
+              <a:buChar char="•"/>
+            </a:pPr>
+            <a:r>
+              <a:rPr lang="en-AU" dirty="0"/>
+              <a:t>Like the blog it was to contain a page header as well, which when clicked on would download the owners latest resume.</a:t>
+            </a:r>
+          </a:p>
+          <a:p>
+            <a:pPr marL="285750" indent="-285750">
+              <a:buFont typeface="Arial" panose="020B0604020202020204" pitchFamily="34" charset="0"/>
+              <a:buChar char="•"/>
+            </a:pPr>
+            <a:r>
+              <a:rPr lang="en-AU" dirty="0"/>
+              <a:t>Most professional section of the site, it is meant to be simplistic so no information is able to be missed.</a:t>
+            </a:r>
+          </a:p>
+        </p:txBody>
+      </p:sp>
+      <p:pic>
+        <p:nvPicPr>
+          <p:cNvPr id="6" name="Picture 5">
+            <a:extLst>
+              <a:ext uri="{FF2B5EF4-FFF2-40B4-BE49-F238E27FC236}">
+                <a16:creationId xmlns:a16="http://schemas.microsoft.com/office/drawing/2014/main" id="{F923E15D-3ECE-47DE-8CD1-093371EC339E}"/>
+              </a:ext>
+            </a:extLst>
+          </p:cNvPr>
+          <p:cNvPicPr>
+            <a:picLocks noChangeAspect="1"/>
+          </p:cNvPicPr>
+          <p:nvPr/>
+        </p:nvPicPr>
+        <p:blipFill>
+          <a:blip r:embed="rId2"/>
+          <a:stretch>
+            <a:fillRect/>
+          </a:stretch>
+        </p:blipFill>
+        <p:spPr>
+          <a:xfrm>
+            <a:off x="685800" y="1720518"/>
+            <a:ext cx="6858000" cy="3112163"/>
+          </a:xfrm>
+          <a:prstGeom prst="rect">
+            <a:avLst/>
+          </a:prstGeom>
+        </p:spPr>
+      </p:pic>
+    </p:spTree>
+    <p:extLst>
+      <p:ext uri="{BB962C8B-B14F-4D97-AF65-F5344CB8AC3E}">
+        <p14:creationId xmlns:p14="http://schemas.microsoft.com/office/powerpoint/2010/main" val="2713227641"/>
+      </p:ext>
+    </p:extLst>
+  </p:cSld>
+  <p:clrMapOvr>
+    <a:masterClrMapping/>
+  </p:clrMapOvr>
+</p:sld>
+</file>
+
+<file path=ppt/slides/slide9.xml><?xml version="1.0" encoding="utf-8"?>
+<p:sld xmlns:a="http://schemas.openxmlformats.org/drawingml/2006/main" xmlns:r="http://schemas.openxmlformats.org/officeDocument/2006/relationships" xmlns:p="http://schemas.openxmlformats.org/presentationml/2006/main">
+  <p:cSld>
+    <p:spTree>
+      <p:nvGrpSpPr>
+        <p:cNvPr id="1" name=""/>
+        <p:cNvGrpSpPr/>
+        <p:nvPr/>
+      </p:nvGrpSpPr>
+      <p:grpSpPr>
+        <a:xfrm>
+          <a:off x="0" y="0"/>
+          <a:ext cx="0" cy="0"/>
+          <a:chOff x="0" y="0"/>
+          <a:chExt cx="0" cy="0"/>
+        </a:xfrm>
+      </p:grpSpPr>
+      <p:sp>
+        <p:nvSpPr>
+          <p:cNvPr id="2" name="Title 1">
+            <a:extLst>
+              <a:ext uri="{FF2B5EF4-FFF2-40B4-BE49-F238E27FC236}">
+                <a16:creationId xmlns:a16="http://schemas.microsoft.com/office/drawing/2014/main" id="{2E0332F2-7D7F-4BD1-B5CB-B1BC122BB426}"/>
+              </a:ext>
+            </a:extLst>
+          </p:cNvPr>
+          <p:cNvSpPr>
+            <a:spLocks noGrp="1"/>
+          </p:cNvSpPr>
+          <p:nvPr>
+            <p:ph type="title"/>
+          </p:nvPr>
+        </p:nvSpPr>
+        <p:spPr/>
+        <p:txBody>
+          <a:bodyPr/>
+          <a:lstStyle/>
+          <a:p>
+            <a:r>
+              <a:rPr lang="en-AU" dirty="0"/>
+              <a:t>But who’s the real YOU??</a:t>
+            </a:r>
+          </a:p>
+        </p:txBody>
+      </p:sp>
+      <p:sp>
+        <p:nvSpPr>
+          <p:cNvPr id="3" name="Content Placeholder 2">
+            <a:extLst>
+              <a:ext uri="{FF2B5EF4-FFF2-40B4-BE49-F238E27FC236}">
+                <a16:creationId xmlns:a16="http://schemas.microsoft.com/office/drawing/2014/main" id="{553C9D85-728D-43DE-A132-9FBF37CC89FA}"/>
+              </a:ext>
+            </a:extLst>
+          </p:cNvPr>
+          <p:cNvSpPr>
+            <a:spLocks noGrp="1"/>
+          </p:cNvSpPr>
+          <p:nvPr>
+            <p:ph idx="1"/>
+          </p:nvPr>
+        </p:nvSpPr>
+        <p:spPr/>
+        <p:txBody>
+          <a:bodyPr/>
+          <a:lstStyle/>
+          <a:p>
+            <a:endParaRPr lang="en-AU"/>
+          </a:p>
+        </p:txBody>
+      </p:sp>
+      <p:sp>
+        <p:nvSpPr>
+          <p:cNvPr id="4" name="Text Placeholder 3">
+            <a:extLst>
+              <a:ext uri="{FF2B5EF4-FFF2-40B4-BE49-F238E27FC236}">
+                <a16:creationId xmlns:a16="http://schemas.microsoft.com/office/drawing/2014/main" id="{D4BA8D7E-BACA-4323-A2B8-25A402268EB6}"/>
+              </a:ext>
+            </a:extLst>
+          </p:cNvPr>
+          <p:cNvSpPr>
+            <a:spLocks noGrp="1"/>
+          </p:cNvSpPr>
+          <p:nvPr>
+            <p:ph type="body" sz="half" idx="2"/>
+          </p:nvPr>
+        </p:nvSpPr>
+        <p:spPr/>
+        <p:txBody>
+          <a:bodyPr>
+            <a:normAutofit fontScale="70000" lnSpcReduction="20000"/>
+          </a:bodyPr>
+          <a:lstStyle/>
+          <a:p>
+            <a:pPr marL="285750" indent="-285750">
+              <a:buFont typeface="Arial" panose="020B0604020202020204" pitchFamily="34" charset="0"/>
+              <a:buChar char="•"/>
+            </a:pPr>
+            <a:r>
+              <a:rPr lang="en-AU" dirty="0"/>
+              <a:t>Ah the about page, I struggled to think of something to make this page unique or stand out. So I didn’t</a:t>
+            </a:r>
+          </a:p>
+          <a:p>
+            <a:pPr marL="285750" indent="-285750">
+              <a:buFont typeface="Arial" panose="020B0604020202020204" pitchFamily="34" charset="0"/>
+              <a:buChar char="•"/>
+            </a:pPr>
+            <a:r>
+              <a:rPr lang="en-AU" dirty="0"/>
+              <a:t>Simple page where it just talks about aspects in the resume.</a:t>
+            </a:r>
+          </a:p>
+          <a:p>
+            <a:pPr marL="285750" indent="-285750">
+              <a:buFont typeface="Arial" panose="020B0604020202020204" pitchFamily="34" charset="0"/>
+              <a:buChar char="•"/>
+            </a:pPr>
+            <a:r>
+              <a:rPr lang="en-AU" dirty="0"/>
+              <a:t>Contains a much more detailed history about the owner, as well as talking about their relationship with coding and the problems they have faced pursuing the passion.</a:t>
+            </a:r>
+          </a:p>
+          <a:p>
+            <a:pPr marL="285750" indent="-285750">
+              <a:buFont typeface="Arial" panose="020B0604020202020204" pitchFamily="34" charset="0"/>
+              <a:buChar char="•"/>
+            </a:pPr>
+            <a:r>
+              <a:rPr lang="en-AU" dirty="0"/>
+              <a:t>Not displayed it was also meant to display some skills and fun facts about the owner in an attempt to get some personality displayed in what is honestly a lacking page design.</a:t>
+            </a:r>
+          </a:p>
+        </p:txBody>
+      </p:sp>
+      <p:pic>
+        <p:nvPicPr>
+          <p:cNvPr id="6" name="Picture 5">
+            <a:extLst>
+              <a:ext uri="{FF2B5EF4-FFF2-40B4-BE49-F238E27FC236}">
+                <a16:creationId xmlns:a16="http://schemas.microsoft.com/office/drawing/2014/main" id="{33DC7EC7-B795-4354-8529-9896BE43D435}"/>
+              </a:ext>
+            </a:extLst>
+          </p:cNvPr>
+          <p:cNvPicPr>
+            <a:picLocks noChangeAspect="1"/>
+          </p:cNvPicPr>
+          <p:nvPr/>
+        </p:nvPicPr>
+        <p:blipFill>
+          <a:blip r:embed="rId2"/>
+          <a:stretch>
+            <a:fillRect/>
+          </a:stretch>
+        </p:blipFill>
+        <p:spPr>
+          <a:xfrm>
+            <a:off x="685800" y="1711687"/>
+            <a:ext cx="6858000" cy="3129825"/>
+          </a:xfrm>
+          <a:prstGeom prst="rect">
+            <a:avLst/>
+          </a:prstGeom>
+        </p:spPr>
+      </p:pic>
+    </p:spTree>
+    <p:extLst>
+      <p:ext uri="{BB962C8B-B14F-4D97-AF65-F5344CB8AC3E}">
+        <p14:creationId xmlns:p14="http://schemas.microsoft.com/office/powerpoint/2010/main" val="1484110654"/>
       </p:ext>
     </p:extLst>
   </p:cSld>
@@ -7840,21 +9652,21 @@
 </file>
 
 <file path=customXml/item1.xml><?xml version="1.0" encoding="utf-8"?>
+<?mso-contentType ?>
+<FormTemplates xmlns="http://schemas.microsoft.com/sharepoint/v3/contenttype/forms">
+  <Display>DocumentLibraryForm</Display>
+  <Edit>DocumentLibraryForm</Edit>
+  <New>DocumentLibraryForm</New>
+</FormTemplates>
+</file>
+
+<file path=customXml/item2.xml><?xml version="1.0" encoding="utf-8"?>
 <p:properties xmlns:p="http://schemas.microsoft.com/office/2006/metadata/properties" xmlns:xsi="http://www.w3.org/2001/XMLSchema-instance" xmlns:pc="http://schemas.microsoft.com/office/infopath/2007/PartnerControls">
   <documentManagement>
     <Status xmlns="71af3243-3dd4-4a8d-8c0d-dd76da1f02a5">Not started</Status>
     <MediaServiceKeyPoints xmlns="71af3243-3dd4-4a8d-8c0d-dd76da1f02a5" xsi:nil="true"/>
   </documentManagement>
 </p:properties>
-</file>
-
-<file path=customXml/item2.xml><?xml version="1.0" encoding="utf-8"?>
-<?mso-contentType ?>
-<FormTemplates xmlns="http://schemas.microsoft.com/sharepoint/v3/contenttype/forms">
-  <Display>DocumentLibraryForm</Display>
-  <Edit>DocumentLibraryForm</Edit>
-  <New>DocumentLibraryForm</New>
-</FormTemplates>
 </file>
 
 <file path=customXml/item3.xml><?xml version="1.0" encoding="utf-8"?>
@@ -8079,19 +9891,19 @@
 </file>
 
 <file path=customXml/itemProps1.xml><?xml version="1.0" encoding="utf-8"?>
+<ds:datastoreItem xmlns:ds="http://schemas.openxmlformats.org/officeDocument/2006/customXml" ds:itemID="{CDB58277-F8DF-46FF-84EC-EF41B835E69F}">
+  <ds:schemaRefs>
+    <ds:schemaRef ds:uri="http://schemas.microsoft.com/sharepoint/v3/contenttype/forms"/>
+  </ds:schemaRefs>
+</ds:datastoreItem>
+</file>
+
+<file path=customXml/itemProps2.xml><?xml version="1.0" encoding="utf-8"?>
 <ds:datastoreItem xmlns:ds="http://schemas.openxmlformats.org/officeDocument/2006/customXml" ds:itemID="{137651BA-F45C-4845-9AB3-E0A65B39F5E1}">
   <ds:schemaRefs>
     <ds:schemaRef ds:uri="http://schemas.microsoft.com/office/2006/metadata/properties"/>
     <ds:schemaRef ds:uri="http://schemas.microsoft.com/office/infopath/2007/PartnerControls"/>
     <ds:schemaRef ds:uri="71af3243-3dd4-4a8d-8c0d-dd76da1f02a5"/>
-  </ds:schemaRefs>
-</ds:datastoreItem>
-</file>
-
-<file path=customXml/itemProps2.xml><?xml version="1.0" encoding="utf-8"?>
-<ds:datastoreItem xmlns:ds="http://schemas.openxmlformats.org/officeDocument/2006/customXml" ds:itemID="{CDB58277-F8DF-46FF-84EC-EF41B835E69F}">
-  <ds:schemaRefs>
-    <ds:schemaRef ds:uri="http://schemas.microsoft.com/sharepoint/v3/contenttype/forms"/>
   </ds:schemaRefs>
 </ds:datastoreItem>
 </file>

</xml_diff>